<commit_message>
Updated figure with kinesis
</commit_message>
<xml_diff>
--- a/docs/img/streaming-figures.pptx
+++ b/docs/img/streaming-figures.pptx
@@ -292,7 +292,7 @@
           <a:p>
             <a:fld id="{FEA1CA3E-06EE-4249-8BD0-4D0D9C6971D8}" type="datetimeFigureOut">
               <a:rPr lang="en-US" smtClean="0"/>
-              <a:t>1/23/14</a:t>
+              <a:t>9/6/14</a:t>
             </a:fld>
             <a:endParaRPr lang="en-US"/>
           </a:p>
@@ -462,7 +462,7 @@
           <a:p>
             <a:fld id="{FEA1CA3E-06EE-4249-8BD0-4D0D9C6971D8}" type="datetimeFigureOut">
               <a:rPr lang="en-US" smtClean="0"/>
-              <a:t>1/23/14</a:t>
+              <a:t>9/6/14</a:t>
             </a:fld>
             <a:endParaRPr lang="en-US"/>
           </a:p>
@@ -642,7 +642,7 @@
           <a:p>
             <a:fld id="{FEA1CA3E-06EE-4249-8BD0-4D0D9C6971D8}" type="datetimeFigureOut">
               <a:rPr lang="en-US" smtClean="0"/>
-              <a:t>1/23/14</a:t>
+              <a:t>9/6/14</a:t>
             </a:fld>
             <a:endParaRPr lang="en-US"/>
           </a:p>
@@ -812,7 +812,7 @@
           <a:p>
             <a:fld id="{FEA1CA3E-06EE-4249-8BD0-4D0D9C6971D8}" type="datetimeFigureOut">
               <a:rPr lang="en-US" smtClean="0"/>
-              <a:t>1/23/14</a:t>
+              <a:t>9/6/14</a:t>
             </a:fld>
             <a:endParaRPr lang="en-US"/>
           </a:p>
@@ -1058,7 +1058,7 @@
           <a:p>
             <a:fld id="{FEA1CA3E-06EE-4249-8BD0-4D0D9C6971D8}" type="datetimeFigureOut">
               <a:rPr lang="en-US" smtClean="0"/>
-              <a:t>1/23/14</a:t>
+              <a:t>9/6/14</a:t>
             </a:fld>
             <a:endParaRPr lang="en-US"/>
           </a:p>
@@ -1346,7 +1346,7 @@
           <a:p>
             <a:fld id="{FEA1CA3E-06EE-4249-8BD0-4D0D9C6971D8}" type="datetimeFigureOut">
               <a:rPr lang="en-US" smtClean="0"/>
-              <a:t>1/23/14</a:t>
+              <a:t>9/6/14</a:t>
             </a:fld>
             <a:endParaRPr lang="en-US"/>
           </a:p>
@@ -1768,7 +1768,7 @@
           <a:p>
             <a:fld id="{FEA1CA3E-06EE-4249-8BD0-4D0D9C6971D8}" type="datetimeFigureOut">
               <a:rPr lang="en-US" smtClean="0"/>
-              <a:t>1/23/14</a:t>
+              <a:t>9/6/14</a:t>
             </a:fld>
             <a:endParaRPr lang="en-US"/>
           </a:p>
@@ -1886,7 +1886,7 @@
           <a:p>
             <a:fld id="{FEA1CA3E-06EE-4249-8BD0-4D0D9C6971D8}" type="datetimeFigureOut">
               <a:rPr lang="en-US" smtClean="0"/>
-              <a:t>1/23/14</a:t>
+              <a:t>9/6/14</a:t>
             </a:fld>
             <a:endParaRPr lang="en-US"/>
           </a:p>
@@ -1981,7 +1981,7 @@
           <a:p>
             <a:fld id="{FEA1CA3E-06EE-4249-8BD0-4D0D9C6971D8}" type="datetimeFigureOut">
               <a:rPr lang="en-US" smtClean="0"/>
-              <a:t>1/23/14</a:t>
+              <a:t>9/6/14</a:t>
             </a:fld>
             <a:endParaRPr lang="en-US"/>
           </a:p>
@@ -2258,7 +2258,7 @@
           <a:p>
             <a:fld id="{FEA1CA3E-06EE-4249-8BD0-4D0D9C6971D8}" type="datetimeFigureOut">
               <a:rPr lang="en-US" smtClean="0"/>
-              <a:t>1/23/14</a:t>
+              <a:t>9/6/14</a:t>
             </a:fld>
             <a:endParaRPr lang="en-US"/>
           </a:p>
@@ -2511,7 +2511,7 @@
           <a:p>
             <a:fld id="{FEA1CA3E-06EE-4249-8BD0-4D0D9C6971D8}" type="datetimeFigureOut">
               <a:rPr lang="en-US" smtClean="0"/>
-              <a:t>1/23/14</a:t>
+              <a:t>9/6/14</a:t>
             </a:fld>
             <a:endParaRPr lang="en-US"/>
           </a:p>
@@ -2724,7 +2724,7 @@
           <a:p>
             <a:fld id="{FEA1CA3E-06EE-4249-8BD0-4D0D9C6971D8}" type="datetimeFigureOut">
               <a:rPr lang="en-US" smtClean="0"/>
-              <a:t>1/23/14</a:t>
+              <a:t>9/6/14</a:t>
             </a:fld>
             <a:endParaRPr lang="en-US"/>
           </a:p>
@@ -3541,7 +3541,7 @@
                   <a:pPr algn="ctr"/>
                   <a:r>
                     <a:rPr lang="en-US" b="1" dirty="0" smtClean="0"/>
-                    <a:t>HDFS</a:t>
+                    <a:t>HDFS/S3</a:t>
                   </a:r>
                   <a:endParaRPr lang="en-US" b="1" dirty="0"/>
                 </a:p>
@@ -3583,8 +3583,8 @@
                 <a:p>
                   <a:pPr algn="ctr"/>
                   <a:r>
-                    <a:rPr lang="en-US" b="1" dirty="0" err="1" smtClean="0"/>
-                    <a:t>ZeroMQ</a:t>
+                    <a:rPr lang="en-US" b="1" dirty="0" smtClean="0"/>
+                    <a:t>Kinesis</a:t>
                   </a:r>
                   <a:endParaRPr lang="en-US" b="1" dirty="0"/>
                 </a:p>

</xml_diff>

<commit_message>
[SPARK-2419][Streaming][Docs] More updates to the streaming programming guide
- Improvements to the kinesis integration guide from @cfregly
- More information about unified input dstreams in main guide

Author: Tathagata Das <tathagata.das1565@gmail.com>
Author: Chris Fregly <chris@fregly.com>

Closes #2307 from tdas/streaming-doc-fix1 and squashes the following commits:

ec40b5d [Tathagata Das] Updated figure with kinesis
fdb9c5e [Tathagata Das] Fixed style issues with kinesis guide
036d219 [Chris Fregly] updated kinesis docs and added an arch diagram
24f622a [Tathagata Das] More modifications.
</commit_message>
<xml_diff>
--- a/docs/img/streaming-figures.pptx
+++ b/docs/img/streaming-figures.pptx
@@ -292,7 +292,7 @@
           <a:p>
             <a:fld id="{FEA1CA3E-06EE-4249-8BD0-4D0D9C6971D8}" type="datetimeFigureOut">
               <a:rPr lang="en-US" smtClean="0"/>
-              <a:t>1/23/14</a:t>
+              <a:t>9/6/14</a:t>
             </a:fld>
             <a:endParaRPr lang="en-US"/>
           </a:p>
@@ -462,7 +462,7 @@
           <a:p>
             <a:fld id="{FEA1CA3E-06EE-4249-8BD0-4D0D9C6971D8}" type="datetimeFigureOut">
               <a:rPr lang="en-US" smtClean="0"/>
-              <a:t>1/23/14</a:t>
+              <a:t>9/6/14</a:t>
             </a:fld>
             <a:endParaRPr lang="en-US"/>
           </a:p>
@@ -642,7 +642,7 @@
           <a:p>
             <a:fld id="{FEA1CA3E-06EE-4249-8BD0-4D0D9C6971D8}" type="datetimeFigureOut">
               <a:rPr lang="en-US" smtClean="0"/>
-              <a:t>1/23/14</a:t>
+              <a:t>9/6/14</a:t>
             </a:fld>
             <a:endParaRPr lang="en-US"/>
           </a:p>
@@ -812,7 +812,7 @@
           <a:p>
             <a:fld id="{FEA1CA3E-06EE-4249-8BD0-4D0D9C6971D8}" type="datetimeFigureOut">
               <a:rPr lang="en-US" smtClean="0"/>
-              <a:t>1/23/14</a:t>
+              <a:t>9/6/14</a:t>
             </a:fld>
             <a:endParaRPr lang="en-US"/>
           </a:p>
@@ -1058,7 +1058,7 @@
           <a:p>
             <a:fld id="{FEA1CA3E-06EE-4249-8BD0-4D0D9C6971D8}" type="datetimeFigureOut">
               <a:rPr lang="en-US" smtClean="0"/>
-              <a:t>1/23/14</a:t>
+              <a:t>9/6/14</a:t>
             </a:fld>
             <a:endParaRPr lang="en-US"/>
           </a:p>
@@ -1346,7 +1346,7 @@
           <a:p>
             <a:fld id="{FEA1CA3E-06EE-4249-8BD0-4D0D9C6971D8}" type="datetimeFigureOut">
               <a:rPr lang="en-US" smtClean="0"/>
-              <a:t>1/23/14</a:t>
+              <a:t>9/6/14</a:t>
             </a:fld>
             <a:endParaRPr lang="en-US"/>
           </a:p>
@@ -1768,7 +1768,7 @@
           <a:p>
             <a:fld id="{FEA1CA3E-06EE-4249-8BD0-4D0D9C6971D8}" type="datetimeFigureOut">
               <a:rPr lang="en-US" smtClean="0"/>
-              <a:t>1/23/14</a:t>
+              <a:t>9/6/14</a:t>
             </a:fld>
             <a:endParaRPr lang="en-US"/>
           </a:p>
@@ -1886,7 +1886,7 @@
           <a:p>
             <a:fld id="{FEA1CA3E-06EE-4249-8BD0-4D0D9C6971D8}" type="datetimeFigureOut">
               <a:rPr lang="en-US" smtClean="0"/>
-              <a:t>1/23/14</a:t>
+              <a:t>9/6/14</a:t>
             </a:fld>
             <a:endParaRPr lang="en-US"/>
           </a:p>
@@ -1981,7 +1981,7 @@
           <a:p>
             <a:fld id="{FEA1CA3E-06EE-4249-8BD0-4D0D9C6971D8}" type="datetimeFigureOut">
               <a:rPr lang="en-US" smtClean="0"/>
-              <a:t>1/23/14</a:t>
+              <a:t>9/6/14</a:t>
             </a:fld>
             <a:endParaRPr lang="en-US"/>
           </a:p>
@@ -2258,7 +2258,7 @@
           <a:p>
             <a:fld id="{FEA1CA3E-06EE-4249-8BD0-4D0D9C6971D8}" type="datetimeFigureOut">
               <a:rPr lang="en-US" smtClean="0"/>
-              <a:t>1/23/14</a:t>
+              <a:t>9/6/14</a:t>
             </a:fld>
             <a:endParaRPr lang="en-US"/>
           </a:p>
@@ -2511,7 +2511,7 @@
           <a:p>
             <a:fld id="{FEA1CA3E-06EE-4249-8BD0-4D0D9C6971D8}" type="datetimeFigureOut">
               <a:rPr lang="en-US" smtClean="0"/>
-              <a:t>1/23/14</a:t>
+              <a:t>9/6/14</a:t>
             </a:fld>
             <a:endParaRPr lang="en-US"/>
           </a:p>
@@ -2724,7 +2724,7 @@
           <a:p>
             <a:fld id="{FEA1CA3E-06EE-4249-8BD0-4D0D9C6971D8}" type="datetimeFigureOut">
               <a:rPr lang="en-US" smtClean="0"/>
-              <a:t>1/23/14</a:t>
+              <a:t>9/6/14</a:t>
             </a:fld>
             <a:endParaRPr lang="en-US"/>
           </a:p>
@@ -3541,7 +3541,7 @@
                   <a:pPr algn="ctr"/>
                   <a:r>
                     <a:rPr lang="en-US" b="1" dirty="0" smtClean="0"/>
-                    <a:t>HDFS</a:t>
+                    <a:t>HDFS/S3</a:t>
                   </a:r>
                   <a:endParaRPr lang="en-US" b="1" dirty="0"/>
                 </a:p>
@@ -3583,8 +3583,8 @@
                 <a:p>
                   <a:pPr algn="ctr"/>
                   <a:r>
-                    <a:rPr lang="en-US" b="1" dirty="0" err="1" smtClean="0"/>
-                    <a:t>ZeroMQ</a:t>
+                    <a:rPr lang="en-US" b="1" dirty="0" smtClean="0"/>
+                    <a:t>Kinesis</a:t>
                   </a:r>
                   <a:endParaRPr lang="en-US" b="1" dirty="0"/>
                 </a:p>

</xml_diff>

<commit_message>
Check out git 440f5f4f9ed37a2fbdb66b1936dea1e2e43a551f
</commit_message>
<xml_diff>
--- a/docs/img/streaming-figures.pptx
+++ b/docs/img/streaming-figures.pptx
@@ -292,7 +292,7 @@
           <a:p>
             <a:fld id="{FEA1CA3E-06EE-4249-8BD0-4D0D9C6971D8}" type="datetimeFigureOut">
               <a:rPr lang="en-US" smtClean="0"/>
-              <a:t>9/6/14</a:t>
+              <a:t>1/23/14</a:t>
             </a:fld>
             <a:endParaRPr lang="en-US"/>
           </a:p>
@@ -462,7 +462,7 @@
           <a:p>
             <a:fld id="{FEA1CA3E-06EE-4249-8BD0-4D0D9C6971D8}" type="datetimeFigureOut">
               <a:rPr lang="en-US" smtClean="0"/>
-              <a:t>9/6/14</a:t>
+              <a:t>1/23/14</a:t>
             </a:fld>
             <a:endParaRPr lang="en-US"/>
           </a:p>
@@ -642,7 +642,7 @@
           <a:p>
             <a:fld id="{FEA1CA3E-06EE-4249-8BD0-4D0D9C6971D8}" type="datetimeFigureOut">
               <a:rPr lang="en-US" smtClean="0"/>
-              <a:t>9/6/14</a:t>
+              <a:t>1/23/14</a:t>
             </a:fld>
             <a:endParaRPr lang="en-US"/>
           </a:p>
@@ -812,7 +812,7 @@
           <a:p>
             <a:fld id="{FEA1CA3E-06EE-4249-8BD0-4D0D9C6971D8}" type="datetimeFigureOut">
               <a:rPr lang="en-US" smtClean="0"/>
-              <a:t>9/6/14</a:t>
+              <a:t>1/23/14</a:t>
             </a:fld>
             <a:endParaRPr lang="en-US"/>
           </a:p>
@@ -1058,7 +1058,7 @@
           <a:p>
             <a:fld id="{FEA1CA3E-06EE-4249-8BD0-4D0D9C6971D8}" type="datetimeFigureOut">
               <a:rPr lang="en-US" smtClean="0"/>
-              <a:t>9/6/14</a:t>
+              <a:t>1/23/14</a:t>
             </a:fld>
             <a:endParaRPr lang="en-US"/>
           </a:p>
@@ -1346,7 +1346,7 @@
           <a:p>
             <a:fld id="{FEA1CA3E-06EE-4249-8BD0-4D0D9C6971D8}" type="datetimeFigureOut">
               <a:rPr lang="en-US" smtClean="0"/>
-              <a:t>9/6/14</a:t>
+              <a:t>1/23/14</a:t>
             </a:fld>
             <a:endParaRPr lang="en-US"/>
           </a:p>
@@ -1768,7 +1768,7 @@
           <a:p>
             <a:fld id="{FEA1CA3E-06EE-4249-8BD0-4D0D9C6971D8}" type="datetimeFigureOut">
               <a:rPr lang="en-US" smtClean="0"/>
-              <a:t>9/6/14</a:t>
+              <a:t>1/23/14</a:t>
             </a:fld>
             <a:endParaRPr lang="en-US"/>
           </a:p>
@@ -1886,7 +1886,7 @@
           <a:p>
             <a:fld id="{FEA1CA3E-06EE-4249-8BD0-4D0D9C6971D8}" type="datetimeFigureOut">
               <a:rPr lang="en-US" smtClean="0"/>
-              <a:t>9/6/14</a:t>
+              <a:t>1/23/14</a:t>
             </a:fld>
             <a:endParaRPr lang="en-US"/>
           </a:p>
@@ -1981,7 +1981,7 @@
           <a:p>
             <a:fld id="{FEA1CA3E-06EE-4249-8BD0-4D0D9C6971D8}" type="datetimeFigureOut">
               <a:rPr lang="en-US" smtClean="0"/>
-              <a:t>9/6/14</a:t>
+              <a:t>1/23/14</a:t>
             </a:fld>
             <a:endParaRPr lang="en-US"/>
           </a:p>
@@ -2258,7 +2258,7 @@
           <a:p>
             <a:fld id="{FEA1CA3E-06EE-4249-8BD0-4D0D9C6971D8}" type="datetimeFigureOut">
               <a:rPr lang="en-US" smtClean="0"/>
-              <a:t>9/6/14</a:t>
+              <a:t>1/23/14</a:t>
             </a:fld>
             <a:endParaRPr lang="en-US"/>
           </a:p>
@@ -2511,7 +2511,7 @@
           <a:p>
             <a:fld id="{FEA1CA3E-06EE-4249-8BD0-4D0D9C6971D8}" type="datetimeFigureOut">
               <a:rPr lang="en-US" smtClean="0"/>
-              <a:t>9/6/14</a:t>
+              <a:t>1/23/14</a:t>
             </a:fld>
             <a:endParaRPr lang="en-US"/>
           </a:p>
@@ -2724,7 +2724,7 @@
           <a:p>
             <a:fld id="{FEA1CA3E-06EE-4249-8BD0-4D0D9C6971D8}" type="datetimeFigureOut">
               <a:rPr lang="en-US" smtClean="0"/>
-              <a:t>9/6/14</a:t>
+              <a:t>1/23/14</a:t>
             </a:fld>
             <a:endParaRPr lang="en-US"/>
           </a:p>
@@ -3541,7 +3541,7 @@
                   <a:pPr algn="ctr"/>
                   <a:r>
                     <a:rPr lang="en-US" b="1" dirty="0" smtClean="0"/>
-                    <a:t>HDFS/S3</a:t>
+                    <a:t>HDFS</a:t>
                   </a:r>
                   <a:endParaRPr lang="en-US" b="1" dirty="0"/>
                 </a:p>
@@ -3583,8 +3583,8 @@
                 <a:p>
                   <a:pPr algn="ctr"/>
                   <a:r>
-                    <a:rPr lang="en-US" b="1" dirty="0" smtClean="0"/>
-                    <a:t>Kinesis</a:t>
+                    <a:rPr lang="en-US" b="1" dirty="0" err="1" smtClean="0"/>
+                    <a:t>ZeroMQ</a:t>
                   </a:r>
                   <a:endParaRPr lang="en-US" b="1" dirty="0"/>
                 </a:p>

</xml_diff>

<commit_message>
Revert "Check out git 440f5f4f9ed37a2fbdb66b1936dea1e2e43a551f"
This reverts commit 65cb452018fe79eea12712eecab7883cf02a57bd.

Conflicts:
	Capfile
</commit_message>
<xml_diff>
--- a/docs/img/streaming-figures.pptx
+++ b/docs/img/streaming-figures.pptx
@@ -292,7 +292,7 @@
           <a:p>
             <a:fld id="{FEA1CA3E-06EE-4249-8BD0-4D0D9C6971D8}" type="datetimeFigureOut">
               <a:rPr lang="en-US" smtClean="0"/>
-              <a:t>1/23/14</a:t>
+              <a:t>9/6/14</a:t>
             </a:fld>
             <a:endParaRPr lang="en-US"/>
           </a:p>
@@ -462,7 +462,7 @@
           <a:p>
             <a:fld id="{FEA1CA3E-06EE-4249-8BD0-4D0D9C6971D8}" type="datetimeFigureOut">
               <a:rPr lang="en-US" smtClean="0"/>
-              <a:t>1/23/14</a:t>
+              <a:t>9/6/14</a:t>
             </a:fld>
             <a:endParaRPr lang="en-US"/>
           </a:p>
@@ -642,7 +642,7 @@
           <a:p>
             <a:fld id="{FEA1CA3E-06EE-4249-8BD0-4D0D9C6971D8}" type="datetimeFigureOut">
               <a:rPr lang="en-US" smtClean="0"/>
-              <a:t>1/23/14</a:t>
+              <a:t>9/6/14</a:t>
             </a:fld>
             <a:endParaRPr lang="en-US"/>
           </a:p>
@@ -812,7 +812,7 @@
           <a:p>
             <a:fld id="{FEA1CA3E-06EE-4249-8BD0-4D0D9C6971D8}" type="datetimeFigureOut">
               <a:rPr lang="en-US" smtClean="0"/>
-              <a:t>1/23/14</a:t>
+              <a:t>9/6/14</a:t>
             </a:fld>
             <a:endParaRPr lang="en-US"/>
           </a:p>
@@ -1058,7 +1058,7 @@
           <a:p>
             <a:fld id="{FEA1CA3E-06EE-4249-8BD0-4D0D9C6971D8}" type="datetimeFigureOut">
               <a:rPr lang="en-US" smtClean="0"/>
-              <a:t>1/23/14</a:t>
+              <a:t>9/6/14</a:t>
             </a:fld>
             <a:endParaRPr lang="en-US"/>
           </a:p>
@@ -1346,7 +1346,7 @@
           <a:p>
             <a:fld id="{FEA1CA3E-06EE-4249-8BD0-4D0D9C6971D8}" type="datetimeFigureOut">
               <a:rPr lang="en-US" smtClean="0"/>
-              <a:t>1/23/14</a:t>
+              <a:t>9/6/14</a:t>
             </a:fld>
             <a:endParaRPr lang="en-US"/>
           </a:p>
@@ -1768,7 +1768,7 @@
           <a:p>
             <a:fld id="{FEA1CA3E-06EE-4249-8BD0-4D0D9C6971D8}" type="datetimeFigureOut">
               <a:rPr lang="en-US" smtClean="0"/>
-              <a:t>1/23/14</a:t>
+              <a:t>9/6/14</a:t>
             </a:fld>
             <a:endParaRPr lang="en-US"/>
           </a:p>
@@ -1886,7 +1886,7 @@
           <a:p>
             <a:fld id="{FEA1CA3E-06EE-4249-8BD0-4D0D9C6971D8}" type="datetimeFigureOut">
               <a:rPr lang="en-US" smtClean="0"/>
-              <a:t>1/23/14</a:t>
+              <a:t>9/6/14</a:t>
             </a:fld>
             <a:endParaRPr lang="en-US"/>
           </a:p>
@@ -1981,7 +1981,7 @@
           <a:p>
             <a:fld id="{FEA1CA3E-06EE-4249-8BD0-4D0D9C6971D8}" type="datetimeFigureOut">
               <a:rPr lang="en-US" smtClean="0"/>
-              <a:t>1/23/14</a:t>
+              <a:t>9/6/14</a:t>
             </a:fld>
             <a:endParaRPr lang="en-US"/>
           </a:p>
@@ -2258,7 +2258,7 @@
           <a:p>
             <a:fld id="{FEA1CA3E-06EE-4249-8BD0-4D0D9C6971D8}" type="datetimeFigureOut">
               <a:rPr lang="en-US" smtClean="0"/>
-              <a:t>1/23/14</a:t>
+              <a:t>9/6/14</a:t>
             </a:fld>
             <a:endParaRPr lang="en-US"/>
           </a:p>
@@ -2511,7 +2511,7 @@
           <a:p>
             <a:fld id="{FEA1CA3E-06EE-4249-8BD0-4D0D9C6971D8}" type="datetimeFigureOut">
               <a:rPr lang="en-US" smtClean="0"/>
-              <a:t>1/23/14</a:t>
+              <a:t>9/6/14</a:t>
             </a:fld>
             <a:endParaRPr lang="en-US"/>
           </a:p>
@@ -2724,7 +2724,7 @@
           <a:p>
             <a:fld id="{FEA1CA3E-06EE-4249-8BD0-4D0D9C6971D8}" type="datetimeFigureOut">
               <a:rPr lang="en-US" smtClean="0"/>
-              <a:t>1/23/14</a:t>
+              <a:t>9/6/14</a:t>
             </a:fld>
             <a:endParaRPr lang="en-US"/>
           </a:p>
@@ -3541,7 +3541,7 @@
                   <a:pPr algn="ctr"/>
                   <a:r>
                     <a:rPr lang="en-US" b="1" dirty="0" smtClean="0"/>
-                    <a:t>HDFS</a:t>
+                    <a:t>HDFS/S3</a:t>
                   </a:r>
                   <a:endParaRPr lang="en-US" b="1" dirty="0"/>
                 </a:p>
@@ -3583,8 +3583,8 @@
                 <a:p>
                   <a:pPr algn="ctr"/>
                   <a:r>
-                    <a:rPr lang="en-US" b="1" dirty="0" err="1" smtClean="0"/>
-                    <a:t>ZeroMQ</a:t>
+                    <a:rPr lang="en-US" b="1" dirty="0" smtClean="0"/>
+                    <a:t>Kinesis</a:t>
                   </a:r>
                   <a:endParaRPr lang="en-US" b="1" dirty="0"/>
                 </a:p>

</xml_diff>